<commit_message>
proof checks and rearranges before practice
</commit_message>
<xml_diff>
--- a/assets/3-cutpoints/graphics.pptx
+++ b/assets/3-cutpoints/graphics.pptx
@@ -262,7 +262,7 @@
           <a:p>
             <a:fld id="{72655A8C-91AA-4D4E-B51E-8D71BCCD0166}" type="datetimeFigureOut">
               <a:rPr lang="en-AU" smtClean="0"/>
-              <a:t>27/11/2023</a:t>
+              <a:t>28/11/2023</a:t>
             </a:fld>
             <a:endParaRPr lang="en-AU"/>
           </a:p>
@@ -462,7 +462,7 @@
           <a:p>
             <a:fld id="{72655A8C-91AA-4D4E-B51E-8D71BCCD0166}" type="datetimeFigureOut">
               <a:rPr lang="en-AU" smtClean="0"/>
-              <a:t>27/11/2023</a:t>
+              <a:t>28/11/2023</a:t>
             </a:fld>
             <a:endParaRPr lang="en-AU"/>
           </a:p>
@@ -672,7 +672,7 @@
           <a:p>
             <a:fld id="{72655A8C-91AA-4D4E-B51E-8D71BCCD0166}" type="datetimeFigureOut">
               <a:rPr lang="en-AU" smtClean="0"/>
-              <a:t>27/11/2023</a:t>
+              <a:t>28/11/2023</a:t>
             </a:fld>
             <a:endParaRPr lang="en-AU"/>
           </a:p>
@@ -872,7 +872,7 @@
           <a:p>
             <a:fld id="{72655A8C-91AA-4D4E-B51E-8D71BCCD0166}" type="datetimeFigureOut">
               <a:rPr lang="en-AU" smtClean="0"/>
-              <a:t>27/11/2023</a:t>
+              <a:t>28/11/2023</a:t>
             </a:fld>
             <a:endParaRPr lang="en-AU"/>
           </a:p>
@@ -1148,7 +1148,7 @@
           <a:p>
             <a:fld id="{72655A8C-91AA-4D4E-B51E-8D71BCCD0166}" type="datetimeFigureOut">
               <a:rPr lang="en-AU" smtClean="0"/>
-              <a:t>27/11/2023</a:t>
+              <a:t>28/11/2023</a:t>
             </a:fld>
             <a:endParaRPr lang="en-AU"/>
           </a:p>
@@ -1416,7 +1416,7 @@
           <a:p>
             <a:fld id="{72655A8C-91AA-4D4E-B51E-8D71BCCD0166}" type="datetimeFigureOut">
               <a:rPr lang="en-AU" smtClean="0"/>
-              <a:t>27/11/2023</a:t>
+              <a:t>28/11/2023</a:t>
             </a:fld>
             <a:endParaRPr lang="en-AU"/>
           </a:p>
@@ -1831,7 +1831,7 @@
           <a:p>
             <a:fld id="{72655A8C-91AA-4D4E-B51E-8D71BCCD0166}" type="datetimeFigureOut">
               <a:rPr lang="en-AU" smtClean="0"/>
-              <a:t>27/11/2023</a:t>
+              <a:t>28/11/2023</a:t>
             </a:fld>
             <a:endParaRPr lang="en-AU"/>
           </a:p>
@@ -1973,7 +1973,7 @@
           <a:p>
             <a:fld id="{72655A8C-91AA-4D4E-B51E-8D71BCCD0166}" type="datetimeFigureOut">
               <a:rPr lang="en-AU" smtClean="0"/>
-              <a:t>27/11/2023</a:t>
+              <a:t>28/11/2023</a:t>
             </a:fld>
             <a:endParaRPr lang="en-AU"/>
           </a:p>
@@ -2086,7 +2086,7 @@
           <a:p>
             <a:fld id="{72655A8C-91AA-4D4E-B51E-8D71BCCD0166}" type="datetimeFigureOut">
               <a:rPr lang="en-AU" smtClean="0"/>
-              <a:t>27/11/2023</a:t>
+              <a:t>28/11/2023</a:t>
             </a:fld>
             <a:endParaRPr lang="en-AU"/>
           </a:p>
@@ -2399,7 +2399,7 @@
           <a:p>
             <a:fld id="{72655A8C-91AA-4D4E-B51E-8D71BCCD0166}" type="datetimeFigureOut">
               <a:rPr lang="en-AU" smtClean="0"/>
-              <a:t>27/11/2023</a:t>
+              <a:t>28/11/2023</a:t>
             </a:fld>
             <a:endParaRPr lang="en-AU"/>
           </a:p>
@@ -2688,7 +2688,7 @@
           <a:p>
             <a:fld id="{72655A8C-91AA-4D4E-B51E-8D71BCCD0166}" type="datetimeFigureOut">
               <a:rPr lang="en-AU" smtClean="0"/>
-              <a:t>27/11/2023</a:t>
+              <a:t>28/11/2023</a:t>
             </a:fld>
             <a:endParaRPr lang="en-AU"/>
           </a:p>
@@ -2931,7 +2931,7 @@
           <a:p>
             <a:fld id="{72655A8C-91AA-4D4E-B51E-8D71BCCD0166}" type="datetimeFigureOut">
               <a:rPr lang="en-AU" smtClean="0"/>
-              <a:t>27/11/2023</a:t>
+              <a:t>28/11/2023</a:t>
             </a:fld>
             <a:endParaRPr lang="en-AU"/>
           </a:p>
@@ -3960,15 +3960,12 @@
               <a:p>
                 <a:pPr algn="ctr"/>
                 <a:r>
-                  <a:rPr lang="en-AU" b="1" dirty="0"/>
-                  <a:t>Treatment </a:t>
+                  <a:rPr lang="en-US" b="1" dirty="0"/>
+                  <a:t>L</a:t>
                 </a:r>
-                <a:br>
-                  <a:rPr lang="en-AU" b="1" dirty="0"/>
-                </a:br>
                 <a:r>
                   <a:rPr lang="en-AU" b="1" dirty="0"/>
-                  <a:t>A</a:t>
+                  <a:t>ow-risk group</a:t>
                 </a:r>
               </a:p>
             </p:txBody>
@@ -4003,15 +4000,16 @@
               <a:p>
                 <a:pPr algn="ctr"/>
                 <a:r>
-                  <a:rPr lang="en-AU" b="1" dirty="0"/>
-                  <a:t>Treatment</a:t>
+                  <a:rPr lang="en-US" b="1" dirty="0"/>
+                  <a:t>H</a:t>
                 </a:r>
-                <a:br>
-                  <a:rPr lang="en-AU" b="1" dirty="0"/>
-                </a:br>
+                <a:r>
+                  <a:rPr lang="en-AU" b="1" dirty="0" err="1"/>
+                  <a:t>igh</a:t>
+                </a:r>
                 <a:r>
                   <a:rPr lang="en-AU" b="1" dirty="0"/>
-                  <a:t>B</a:t>
+                  <a:t>-risk group</a:t>
                 </a:r>
               </a:p>
             </p:txBody>

</xml_diff>